<commit_message>
Description of codes added
</commit_message>
<xml_diff>
--- a/Descriptions/JazzGuestsXml.pptx
+++ b/Descriptions/JazzGuestsXml.pptx
@@ -7,7 +7,8 @@
   <p:sldIdLst>
     <p:sldId id="277" r:id="rId2"/>
     <p:sldId id="275" r:id="rId3"/>
-    <p:sldId id="276" r:id="rId4"/>
+    <p:sldId id="278" r:id="rId4"/>
+    <p:sldId id="276" r:id="rId5"/>
   </p:sldIdLst>
   <p:sldSz cx="12192000" cy="6858000"/>
   <p:notesSz cx="6858000" cy="9144000"/>
@@ -245,7 +246,7 @@
           <a:p>
             <a:fld id="{9A42C61D-D669-4B9E-81E6-AA43D08BFCD1}" type="datetimeFigureOut">
               <a:rPr lang="de-CH" smtClean="0"/>
-              <a:t>12.03.2024</a:t>
+              <a:t>06.10.2024</a:t>
             </a:fld>
             <a:endParaRPr lang="de-CH"/>
           </a:p>
@@ -415,7 +416,7 @@
           <a:p>
             <a:fld id="{9A42C61D-D669-4B9E-81E6-AA43D08BFCD1}" type="datetimeFigureOut">
               <a:rPr lang="de-CH" smtClean="0"/>
-              <a:t>12.03.2024</a:t>
+              <a:t>06.10.2024</a:t>
             </a:fld>
             <a:endParaRPr lang="de-CH"/>
           </a:p>
@@ -595,7 +596,7 @@
           <a:p>
             <a:fld id="{9A42C61D-D669-4B9E-81E6-AA43D08BFCD1}" type="datetimeFigureOut">
               <a:rPr lang="de-CH" smtClean="0"/>
-              <a:t>12.03.2024</a:t>
+              <a:t>06.10.2024</a:t>
             </a:fld>
             <a:endParaRPr lang="de-CH"/>
           </a:p>
@@ -765,7 +766,7 @@
           <a:p>
             <a:fld id="{9A42C61D-D669-4B9E-81E6-AA43D08BFCD1}" type="datetimeFigureOut">
               <a:rPr lang="de-CH" smtClean="0"/>
-              <a:t>12.03.2024</a:t>
+              <a:t>06.10.2024</a:t>
             </a:fld>
             <a:endParaRPr lang="de-CH"/>
           </a:p>
@@ -1011,7 +1012,7 @@
           <a:p>
             <a:fld id="{9A42C61D-D669-4B9E-81E6-AA43D08BFCD1}" type="datetimeFigureOut">
               <a:rPr lang="de-CH" smtClean="0"/>
-              <a:t>12.03.2024</a:t>
+              <a:t>06.10.2024</a:t>
             </a:fld>
             <a:endParaRPr lang="de-CH"/>
           </a:p>
@@ -1243,7 +1244,7 @@
           <a:p>
             <a:fld id="{9A42C61D-D669-4B9E-81E6-AA43D08BFCD1}" type="datetimeFigureOut">
               <a:rPr lang="de-CH" smtClean="0"/>
-              <a:t>12.03.2024</a:t>
+              <a:t>06.10.2024</a:t>
             </a:fld>
             <a:endParaRPr lang="de-CH"/>
           </a:p>
@@ -1610,7 +1611,7 @@
           <a:p>
             <a:fld id="{9A42C61D-D669-4B9E-81E6-AA43D08BFCD1}" type="datetimeFigureOut">
               <a:rPr lang="de-CH" smtClean="0"/>
-              <a:t>12.03.2024</a:t>
+              <a:t>06.10.2024</a:t>
             </a:fld>
             <a:endParaRPr lang="de-CH"/>
           </a:p>
@@ -1728,7 +1729,7 @@
           <a:p>
             <a:fld id="{9A42C61D-D669-4B9E-81E6-AA43D08BFCD1}" type="datetimeFigureOut">
               <a:rPr lang="de-CH" smtClean="0"/>
-              <a:t>12.03.2024</a:t>
+              <a:t>06.10.2024</a:t>
             </a:fld>
             <a:endParaRPr lang="de-CH"/>
           </a:p>
@@ -1823,7 +1824,7 @@
           <a:p>
             <a:fld id="{9A42C61D-D669-4B9E-81E6-AA43D08BFCD1}" type="datetimeFigureOut">
               <a:rPr lang="de-CH" smtClean="0"/>
-              <a:t>12.03.2024</a:t>
+              <a:t>06.10.2024</a:t>
             </a:fld>
             <a:endParaRPr lang="de-CH"/>
           </a:p>
@@ -2100,7 +2101,7 @@
           <a:p>
             <a:fld id="{9A42C61D-D669-4B9E-81E6-AA43D08BFCD1}" type="datetimeFigureOut">
               <a:rPr lang="de-CH" smtClean="0"/>
-              <a:t>12.03.2024</a:t>
+              <a:t>06.10.2024</a:t>
             </a:fld>
             <a:endParaRPr lang="de-CH"/>
           </a:p>
@@ -2353,7 +2354,7 @@
           <a:p>
             <a:fld id="{9A42C61D-D669-4B9E-81E6-AA43D08BFCD1}" type="datetimeFigureOut">
               <a:rPr lang="de-CH" smtClean="0"/>
-              <a:t>12.03.2024</a:t>
+              <a:t>06.10.2024</a:t>
             </a:fld>
             <a:endParaRPr lang="de-CH"/>
           </a:p>
@@ -2566,7 +2567,7 @@
           <a:p>
             <a:fld id="{9A42C61D-D669-4B9E-81E6-AA43D08BFCD1}" type="datetimeFigureOut">
               <a:rPr lang="de-CH" smtClean="0"/>
-              <a:t>12.03.2024</a:t>
+              <a:t>06.10.2024</a:t>
             </a:fld>
             <a:endParaRPr lang="de-CH"/>
           </a:p>
@@ -4172,7 +4173,7 @@
         </p:nvSpPr>
         <p:spPr>
           <a:xfrm>
-            <a:off x="3805032" y="1097460"/>
+            <a:off x="3442423" y="1097460"/>
             <a:ext cx="4611761" cy="5333157"/>
           </a:xfrm>
           <a:prstGeom prst="rect">
@@ -4230,7 +4231,7 @@
         </p:nvSpPr>
         <p:spPr>
           <a:xfrm>
-            <a:off x="3805032" y="785525"/>
+            <a:off x="3442423" y="785525"/>
             <a:ext cx="4810543" cy="307777"/>
           </a:xfrm>
           <a:prstGeom prst="rect">
@@ -4272,7 +4273,7 @@
         </p:nvSpPr>
         <p:spPr>
           <a:xfrm>
-            <a:off x="3901119" y="1250913"/>
+            <a:off x="3538510" y="1250913"/>
             <a:ext cx="4389767" cy="1600438"/>
           </a:xfrm>
           <a:prstGeom prst="rect">
@@ -4478,7 +4479,7 @@
         </p:nvSpPr>
         <p:spPr>
           <a:xfrm>
-            <a:off x="3901116" y="4966756"/>
+            <a:off x="3538507" y="4966756"/>
             <a:ext cx="4389767" cy="1231106"/>
           </a:xfrm>
           <a:prstGeom prst="rect">
@@ -4684,7 +4685,7 @@
         </p:nvSpPr>
         <p:spPr>
           <a:xfrm>
-            <a:off x="3901117" y="3040546"/>
+            <a:off x="3538508" y="3040546"/>
             <a:ext cx="4389767" cy="1600438"/>
           </a:xfrm>
           <a:prstGeom prst="rect">
@@ -5007,6 +5008,497 @@
 </file>
 
 <file path=ppt/slides/slide3.xml><?xml version="1.0" encoding="utf-8"?>
+<p:sld xmlns:a="http://schemas.openxmlformats.org/drawingml/2006/main" xmlns:r="http://schemas.openxmlformats.org/officeDocument/2006/relationships" xmlns:p="http://schemas.openxmlformats.org/presentationml/2006/main">
+  <p:cSld>
+    <p:spTree>
+      <p:nvGrpSpPr>
+        <p:cNvPr id="1" name=""/>
+        <p:cNvGrpSpPr/>
+        <p:nvPr/>
+      </p:nvGrpSpPr>
+      <p:grpSpPr>
+        <a:xfrm>
+          <a:off x="0" y="0"/>
+          <a:ext cx="0" cy="0"/>
+          <a:chOff x="0" y="0"/>
+          <a:chExt cx="0" cy="0"/>
+        </a:xfrm>
+      </p:grpSpPr>
+      <p:sp>
+        <p:nvSpPr>
+          <p:cNvPr id="5" name="Textfeld 4">
+            <a:extLst>
+              <a:ext uri="{FF2B5EF4-FFF2-40B4-BE49-F238E27FC236}">
+                <a16:creationId xmlns:a16="http://schemas.microsoft.com/office/drawing/2014/main" id="{C1BC86C3-7B0E-828A-4FCD-BDAED53E6799}"/>
+              </a:ext>
+            </a:extLst>
+          </p:cNvPr>
+          <p:cNvSpPr txBox="1"/>
+          <p:nvPr/>
+        </p:nvSpPr>
+        <p:spPr>
+          <a:xfrm>
+            <a:off x="2544161" y="438072"/>
+            <a:ext cx="6097314" cy="369332"/>
+          </a:xfrm>
+          <a:prstGeom prst="rect">
+            <a:avLst/>
+          </a:prstGeom>
+          <a:noFill/>
+        </p:spPr>
+        <p:txBody>
+          <a:bodyPr wrap="square">
+            <a:spAutoFit/>
+          </a:bodyPr>
+          <a:lstStyle/>
+          <a:p>
+            <a:pPr algn="ctr"/>
+            <a:r>
+              <a:rPr lang="fr-FR" b="1" dirty="0" err="1">
+                <a:solidFill>
+                  <a:srgbClr val="FF0000"/>
+                </a:solidFill>
+                <a:latin typeface="Arial" panose="020B0604020202020204" pitchFamily="34" charset="0"/>
+                <a:cs typeface="Arial" panose="020B0604020202020204" pitchFamily="34" charset="0"/>
+              </a:rPr>
+              <a:t>Status</a:t>
+            </a:r>
+            <a:r>
+              <a:rPr lang="fr-FR" b="1" dirty="0">
+                <a:solidFill>
+                  <a:srgbClr val="FF0000"/>
+                </a:solidFill>
+                <a:latin typeface="Arial" panose="020B0604020202020204" pitchFamily="34" charset="0"/>
+                <a:cs typeface="Arial" panose="020B0604020202020204" pitchFamily="34" charset="0"/>
+              </a:rPr>
+              <a:t> Codes</a:t>
+            </a:r>
+          </a:p>
+        </p:txBody>
+      </p:sp>
+      <p:sp>
+        <p:nvSpPr>
+          <p:cNvPr id="6" name="Textfeld 5">
+            <a:extLst>
+              <a:ext uri="{FF2B5EF4-FFF2-40B4-BE49-F238E27FC236}">
+                <a16:creationId xmlns:a16="http://schemas.microsoft.com/office/drawing/2014/main" id="{4B38FEEB-A297-5454-FEA8-249103B8DDF8}"/>
+              </a:ext>
+            </a:extLst>
+          </p:cNvPr>
+          <p:cNvSpPr txBox="1"/>
+          <p:nvPr/>
+        </p:nvSpPr>
+        <p:spPr>
+          <a:xfrm>
+            <a:off x="457200" y="834415"/>
+            <a:ext cx="10439545" cy="5262979"/>
+          </a:xfrm>
+          <a:prstGeom prst="rect">
+            <a:avLst/>
+          </a:prstGeom>
+          <a:noFill/>
+        </p:spPr>
+        <p:txBody>
+          <a:bodyPr wrap="square" rtlCol="0">
+            <a:spAutoFit/>
+          </a:bodyPr>
+          <a:lstStyle/>
+          <a:p>
+            <a:r>
+              <a:rPr lang="en-US" sz="1400" b="1" dirty="0">
+                <a:latin typeface="Arial" panose="020B0604020202020204" pitchFamily="34" charset="0"/>
+                <a:cs typeface="Arial" panose="020B0604020202020204" pitchFamily="34" charset="0"/>
+              </a:rPr>
+              <a:t>Code 1: &lt;</a:t>
+            </a:r>
+            <a:r>
+              <a:rPr lang="en-US" sz="1400" b="1" dirty="0" err="1">
+                <a:latin typeface="Arial" panose="020B0604020202020204" pitchFamily="34" charset="0"/>
+                <a:cs typeface="Arial" panose="020B0604020202020204" pitchFamily="34" charset="0"/>
+              </a:rPr>
+              <a:t>JazzGuestStatus</a:t>
+            </a:r>
+            <a:r>
+              <a:rPr lang="en-US" sz="1400" b="1" dirty="0">
+                <a:latin typeface="Arial" panose="020B0604020202020204" pitchFamily="34" charset="0"/>
+                <a:cs typeface="Arial" panose="020B0604020202020204" pitchFamily="34" charset="0"/>
+              </a:rPr>
+              <a:t>&gt;</a:t>
+            </a:r>
+            <a:r>
+              <a:rPr lang="en-US" sz="1400" b="1" dirty="0" err="1">
+                <a:latin typeface="Arial" panose="020B0604020202020204" pitchFamily="34" charset="0"/>
+                <a:cs typeface="Arial" panose="020B0604020202020204" pitchFamily="34" charset="0"/>
+              </a:rPr>
+              <a:t>AddedOrCheckedRecordByAdmin</a:t>
+            </a:r>
+            <a:r>
+              <a:rPr lang="en-US" sz="1400" b="1" dirty="0">
+                <a:latin typeface="Arial" panose="020B0604020202020204" pitchFamily="34" charset="0"/>
+                <a:cs typeface="Arial" panose="020B0604020202020204" pitchFamily="34" charset="0"/>
+              </a:rPr>
+              <a:t>&lt;</a:t>
+            </a:r>
+          </a:p>
+          <a:p>
+            <a:r>
+              <a:rPr lang="en-US" sz="1400" b="1" dirty="0">
+                <a:latin typeface="Arial" panose="020B0604020202020204" pitchFamily="34" charset="0"/>
+                <a:cs typeface="Arial" panose="020B0604020202020204" pitchFamily="34" charset="0"/>
+              </a:rPr>
+              <a:t>Code 2: &lt;</a:t>
+            </a:r>
+            <a:r>
+              <a:rPr lang="en-US" sz="1400" b="1" dirty="0" err="1">
+                <a:latin typeface="Arial" panose="020B0604020202020204" pitchFamily="34" charset="0"/>
+                <a:cs typeface="Arial" panose="020B0604020202020204" pitchFamily="34" charset="0"/>
+              </a:rPr>
+              <a:t>JazzGuestStatus</a:t>
+            </a:r>
+            <a:r>
+              <a:rPr lang="en-US" sz="1400" b="1" dirty="0">
+                <a:latin typeface="Arial" panose="020B0604020202020204" pitchFamily="34" charset="0"/>
+                <a:cs typeface="Arial" panose="020B0604020202020204" pitchFamily="34" charset="0"/>
+              </a:rPr>
+              <a:t>&gt;</a:t>
+            </a:r>
+            <a:r>
+              <a:rPr lang="en-US" sz="1400" b="1" dirty="0" err="1">
+                <a:latin typeface="Arial" panose="020B0604020202020204" pitchFamily="34" charset="0"/>
+                <a:cs typeface="Arial" panose="020B0604020202020204" pitchFamily="34" charset="0"/>
+              </a:rPr>
+              <a:t>UploadedRecordByGuestToHomepage</a:t>
+            </a:r>
+            <a:r>
+              <a:rPr lang="en-US" sz="1400" b="1" dirty="0">
+                <a:latin typeface="Arial" panose="020B0604020202020204" pitchFamily="34" charset="0"/>
+                <a:cs typeface="Arial" panose="020B0604020202020204" pitchFamily="34" charset="0"/>
+              </a:rPr>
+              <a:t>&lt;</a:t>
+            </a:r>
+          </a:p>
+          <a:p>
+            <a:r>
+              <a:rPr lang="en-US" sz="1400" b="1" dirty="0">
+                <a:latin typeface="Arial" panose="020B0604020202020204" pitchFamily="34" charset="0"/>
+                <a:cs typeface="Arial" panose="020B0604020202020204" pitchFamily="34" charset="0"/>
+              </a:rPr>
+              <a:t>Code 3:&lt;</a:t>
+            </a:r>
+            <a:r>
+              <a:rPr lang="en-US" sz="1400" b="1" dirty="0" err="1">
+                <a:latin typeface="Arial" panose="020B0604020202020204" pitchFamily="34" charset="0"/>
+                <a:cs typeface="Arial" panose="020B0604020202020204" pitchFamily="34" charset="0"/>
+              </a:rPr>
+              <a:t>JazzGuestStatus</a:t>
+            </a:r>
+            <a:r>
+              <a:rPr lang="en-US" sz="1400" b="1" dirty="0">
+                <a:latin typeface="Arial" panose="020B0604020202020204" pitchFamily="34" charset="0"/>
+                <a:cs typeface="Arial" panose="020B0604020202020204" pitchFamily="34" charset="0"/>
+              </a:rPr>
+              <a:t>&gt;</a:t>
+            </a:r>
+            <a:r>
+              <a:rPr lang="en-US" sz="1400" b="1" dirty="0" err="1">
+                <a:latin typeface="Arial" panose="020B0604020202020204" pitchFamily="34" charset="0"/>
+                <a:cs typeface="Arial" panose="020B0604020202020204" pitchFamily="34" charset="0"/>
+              </a:rPr>
+              <a:t>PendingRecordInUploaded</a:t>
+            </a:r>
+            <a:r>
+              <a:rPr lang="en-US" sz="1400" b="1" dirty="0">
+                <a:latin typeface="Arial" panose="020B0604020202020204" pitchFamily="34" charset="0"/>
+                <a:cs typeface="Arial" panose="020B0604020202020204" pitchFamily="34" charset="0"/>
+              </a:rPr>
+              <a:t>&lt;</a:t>
+            </a:r>
+          </a:p>
+          <a:p>
+            <a:r>
+              <a:rPr lang="en-US" sz="1400" b="1" dirty="0">
+                <a:latin typeface="Arial" panose="020B0604020202020204" pitchFamily="34" charset="0"/>
+                <a:cs typeface="Arial" panose="020B0604020202020204" pitchFamily="34" charset="0"/>
+              </a:rPr>
+              <a:t>Code 4: &lt;</a:t>
+            </a:r>
+            <a:r>
+              <a:rPr lang="en-US" sz="1400" b="1" dirty="0" err="1">
+                <a:latin typeface="Arial" panose="020B0604020202020204" pitchFamily="34" charset="0"/>
+                <a:cs typeface="Arial" panose="020B0604020202020204" pitchFamily="34" charset="0"/>
+              </a:rPr>
+              <a:t>JazzGuestStatus</a:t>
+            </a:r>
+            <a:r>
+              <a:rPr lang="en-US" sz="1400" b="1" dirty="0">
+                <a:latin typeface="Arial" panose="020B0604020202020204" pitchFamily="34" charset="0"/>
+                <a:cs typeface="Arial" panose="020B0604020202020204" pitchFamily="34" charset="0"/>
+              </a:rPr>
+              <a:t>&gt;</a:t>
+            </a:r>
+            <a:r>
+              <a:rPr lang="en-US" sz="1400" b="1" dirty="0" err="1">
+                <a:latin typeface="Arial" panose="020B0604020202020204" pitchFamily="34" charset="0"/>
+                <a:cs typeface="Arial" panose="020B0604020202020204" pitchFamily="34" charset="0"/>
+              </a:rPr>
+              <a:t>TEST_AddedOrCheckedRecordByAdmin</a:t>
+            </a:r>
+            <a:r>
+              <a:rPr lang="en-US" sz="1400" b="1" dirty="0">
+                <a:latin typeface="Arial" panose="020B0604020202020204" pitchFamily="34" charset="0"/>
+                <a:cs typeface="Arial" panose="020B0604020202020204" pitchFamily="34" charset="0"/>
+              </a:rPr>
+              <a:t>&lt;            </a:t>
+            </a:r>
+            <a:r>
+              <a:rPr lang="en-US" sz="1400" b="1" i="1" dirty="0">
+                <a:latin typeface="Arial" panose="020B0604020202020204" pitchFamily="34" charset="0"/>
+                <a:cs typeface="Arial" panose="020B0604020202020204" pitchFamily="34" charset="0"/>
+              </a:rPr>
+              <a:t>Only for the testing phase</a:t>
+            </a:r>
+          </a:p>
+          <a:p>
+            <a:endParaRPr lang="en-US" sz="1400" b="1" dirty="0">
+              <a:latin typeface="Arial" panose="020B0604020202020204" pitchFamily="34" charset="0"/>
+              <a:cs typeface="Arial" panose="020B0604020202020204" pitchFamily="34" charset="0"/>
+            </a:endParaRPr>
+          </a:p>
+          <a:p>
+            <a:r>
+              <a:rPr lang="en-US" sz="1400" b="1" dirty="0">
+                <a:latin typeface="Arial" panose="020B0604020202020204" pitchFamily="34" charset="0"/>
+                <a:cs typeface="Arial" panose="020B0604020202020204" pitchFamily="34" charset="0"/>
+              </a:rPr>
+              <a:t>The first code is for images that have been uploaded or checked by Guestbook Admin (GuestbookAdmin.htm)</a:t>
+            </a:r>
+          </a:p>
+          <a:p>
+            <a:r>
+              <a:rPr lang="en-US" sz="1400" b="1" dirty="0">
+                <a:latin typeface="Arial" panose="020B0604020202020204" pitchFamily="34" charset="0"/>
+                <a:cs typeface="Arial" panose="020B0604020202020204" pitchFamily="34" charset="0"/>
+              </a:rPr>
+              <a:t>The second code is for images that have been uploaded directly to the homepage by the user Guestbook Upload (GuestbookUpload.htm)</a:t>
+            </a:r>
+          </a:p>
+          <a:p>
+            <a:r>
+              <a:rPr lang="en-US" sz="1400" b="1" dirty="0">
+                <a:latin typeface="Arial" panose="020B0604020202020204" pitchFamily="34" charset="0"/>
+                <a:cs typeface="Arial" panose="020B0604020202020204" pitchFamily="34" charset="0"/>
+              </a:rPr>
+              <a:t>The third code is for images that the user has uploaded with Guestbook Upload and the administrator has got the message to check and upload to the homepage. </a:t>
+            </a:r>
+            <a:r>
+              <a:rPr lang="en-US" sz="1400" b="1" i="1" dirty="0">
+                <a:latin typeface="Arial" panose="020B0604020202020204" pitchFamily="34" charset="0"/>
+                <a:cs typeface="Arial" panose="020B0604020202020204" pitchFamily="34" charset="0"/>
+              </a:rPr>
+              <a:t>This code is not yet used.</a:t>
+            </a:r>
+          </a:p>
+          <a:p>
+            <a:r>
+              <a:rPr lang="en-US" sz="1400" b="1" dirty="0">
+                <a:latin typeface="Arial" panose="020B0604020202020204" pitchFamily="34" charset="0"/>
+                <a:cs typeface="Arial" panose="020B0604020202020204" pitchFamily="34" charset="0"/>
+              </a:rPr>
+              <a:t>The fourth code has been used for the testing phase</a:t>
+            </a:r>
+          </a:p>
+          <a:p>
+            <a:endParaRPr lang="en-US" sz="1400" b="1" dirty="0">
+              <a:latin typeface="Arial" panose="020B0604020202020204" pitchFamily="34" charset="0"/>
+              <a:cs typeface="Arial" panose="020B0604020202020204" pitchFamily="34" charset="0"/>
+            </a:endParaRPr>
+          </a:p>
+          <a:p>
+            <a:r>
+              <a:rPr lang="en-US" sz="1400" b="1" dirty="0">
+                <a:latin typeface="Arial" panose="020B0604020202020204" pitchFamily="34" charset="0"/>
+                <a:cs typeface="Arial" panose="020B0604020202020204" pitchFamily="34" charset="0"/>
+              </a:rPr>
+              <a:t>There are member functions to get the codes (strings) like for instance </a:t>
+            </a:r>
+          </a:p>
+          <a:p>
+            <a:r>
+              <a:rPr lang="en-US" sz="1400" b="1" dirty="0" err="1">
+                <a:latin typeface="Arial" panose="020B0604020202020204" pitchFamily="34" charset="0"/>
+                <a:cs typeface="Arial" panose="020B0604020202020204" pitchFamily="34" charset="0"/>
+              </a:rPr>
+              <a:t>statusUserUploadedRecordToHomepage</a:t>
+            </a:r>
+            <a:r>
+              <a:rPr lang="en-US" sz="1400" b="1" dirty="0">
+                <a:latin typeface="Arial" panose="020B0604020202020204" pitchFamily="34" charset="0"/>
+                <a:cs typeface="Arial" panose="020B0604020202020204" pitchFamily="34" charset="0"/>
+              </a:rPr>
+              <a:t>()</a:t>
+            </a:r>
+          </a:p>
+          <a:p>
+            <a:r>
+              <a:rPr lang="en-US" sz="1400" b="1" dirty="0">
+                <a:latin typeface="Arial" panose="020B0604020202020204" pitchFamily="34" charset="0"/>
+                <a:cs typeface="Arial" panose="020B0604020202020204" pitchFamily="34" charset="0"/>
+              </a:rPr>
+              <a:t>For each code there is also a description like </a:t>
+            </a:r>
+            <a:r>
+              <a:rPr lang="en-US" sz="1400" b="1">
+                <a:latin typeface="Arial" panose="020B0604020202020204" pitchFamily="34" charset="0"/>
+                <a:cs typeface="Arial" panose="020B0604020202020204" pitchFamily="34" charset="0"/>
+              </a:rPr>
+              <a:t>for instance</a:t>
+            </a:r>
+            <a:endParaRPr lang="en-US" sz="1400" b="1" dirty="0">
+              <a:latin typeface="Arial" panose="020B0604020202020204" pitchFamily="34" charset="0"/>
+              <a:cs typeface="Arial" panose="020B0604020202020204" pitchFamily="34" charset="0"/>
+            </a:endParaRPr>
+          </a:p>
+          <a:p>
+            <a:r>
+              <a:rPr lang="en-US" sz="1400" b="1" dirty="0" err="1">
+                <a:latin typeface="Arial" panose="020B0604020202020204" pitchFamily="34" charset="0"/>
+                <a:cs typeface="Arial" panose="020B0604020202020204" pitchFamily="34" charset="0"/>
+              </a:rPr>
+              <a:t>statusDescriptionUserUploadedRecordToHomepage</a:t>
+            </a:r>
+            <a:endParaRPr lang="en-US" sz="1400" b="1" dirty="0">
+              <a:latin typeface="Arial" panose="020B0604020202020204" pitchFamily="34" charset="0"/>
+              <a:cs typeface="Arial" panose="020B0604020202020204" pitchFamily="34" charset="0"/>
+            </a:endParaRPr>
+          </a:p>
+          <a:p>
+            <a:r>
+              <a:rPr lang="en-US" sz="1400" b="1" dirty="0">
+                <a:latin typeface="Arial" panose="020B0604020202020204" pitchFamily="34" charset="0"/>
+                <a:cs typeface="Arial" panose="020B0604020202020204" pitchFamily="34" charset="0"/>
+              </a:rPr>
+              <a:t>There is a function to get the description for a given code</a:t>
+            </a:r>
+          </a:p>
+          <a:p>
+            <a:r>
+              <a:rPr lang="en-US" sz="1400" b="1" dirty="0" err="1">
+                <a:latin typeface="Arial" panose="020B0604020202020204" pitchFamily="34" charset="0"/>
+                <a:cs typeface="Arial" panose="020B0604020202020204" pitchFamily="34" charset="0"/>
+              </a:rPr>
+              <a:t>getStatusDescription</a:t>
+            </a:r>
+            <a:r>
+              <a:rPr lang="en-US" sz="1400" b="1" dirty="0">
+                <a:latin typeface="Arial" panose="020B0604020202020204" pitchFamily="34" charset="0"/>
+                <a:cs typeface="Arial" panose="020B0604020202020204" pitchFamily="34" charset="0"/>
+              </a:rPr>
+              <a:t>(</a:t>
+            </a:r>
+            <a:r>
+              <a:rPr lang="en-US" sz="1400" b="1" dirty="0" err="1">
+                <a:latin typeface="Arial" panose="020B0604020202020204" pitchFamily="34" charset="0"/>
+                <a:cs typeface="Arial" panose="020B0604020202020204" pitchFamily="34" charset="0"/>
+              </a:rPr>
+              <a:t>i_status_key</a:t>
+            </a:r>
+            <a:r>
+              <a:rPr lang="en-US" sz="1400" b="1" dirty="0">
+                <a:latin typeface="Arial" panose="020B0604020202020204" pitchFamily="34" charset="0"/>
+                <a:cs typeface="Arial" panose="020B0604020202020204" pitchFamily="34" charset="0"/>
+              </a:rPr>
+              <a:t>)</a:t>
+            </a:r>
+          </a:p>
+          <a:p>
+            <a:endParaRPr lang="en-US" sz="1400" b="1" dirty="0">
+              <a:latin typeface="Arial" panose="020B0604020202020204" pitchFamily="34" charset="0"/>
+              <a:cs typeface="Arial" panose="020B0604020202020204" pitchFamily="34" charset="0"/>
+            </a:endParaRPr>
+          </a:p>
+          <a:p>
+            <a:r>
+              <a:rPr lang="en-US" sz="1400" b="1" dirty="0">
+                <a:latin typeface="Arial" panose="020B0604020202020204" pitchFamily="34" charset="0"/>
+                <a:cs typeface="Arial" panose="020B0604020202020204" pitchFamily="34" charset="0"/>
+              </a:rPr>
+              <a:t>There are member functions to set the code like for instance</a:t>
+            </a:r>
+          </a:p>
+          <a:p>
+            <a:r>
+              <a:rPr lang="en-US" sz="1400" b="1" dirty="0" err="1">
+                <a:latin typeface="Arial" panose="020B0604020202020204" pitchFamily="34" charset="0"/>
+                <a:cs typeface="Arial" panose="020B0604020202020204" pitchFamily="34" charset="0"/>
+              </a:rPr>
+              <a:t>setGuestStatusUploadedByGuestToHomepage</a:t>
+            </a:r>
+            <a:endParaRPr lang="en-US" sz="1400" b="1" dirty="0">
+              <a:latin typeface="Arial" panose="020B0604020202020204" pitchFamily="34" charset="0"/>
+              <a:cs typeface="Arial" panose="020B0604020202020204" pitchFamily="34" charset="0"/>
+            </a:endParaRPr>
+          </a:p>
+          <a:p>
+            <a:endParaRPr lang="en-US" sz="1400" b="1" dirty="0">
+              <a:latin typeface="Arial" panose="020B0604020202020204" pitchFamily="34" charset="0"/>
+              <a:cs typeface="Arial" panose="020B0604020202020204" pitchFamily="34" charset="0"/>
+            </a:endParaRPr>
+          </a:p>
+          <a:p>
+            <a:r>
+              <a:rPr lang="en-US" sz="1400" b="1" dirty="0">
+                <a:latin typeface="Arial" panose="020B0604020202020204" pitchFamily="34" charset="0"/>
+                <a:cs typeface="Arial" panose="020B0604020202020204" pitchFamily="34" charset="0"/>
+              </a:rPr>
+              <a:t>For each code there is a function to find out which code an image record has for instance</a:t>
+            </a:r>
+          </a:p>
+          <a:p>
+            <a:r>
+              <a:rPr lang="en-US" sz="1400" b="1" dirty="0" err="1">
+                <a:latin typeface="Arial" panose="020B0604020202020204" pitchFamily="34" charset="0"/>
+                <a:cs typeface="Arial" panose="020B0604020202020204" pitchFamily="34" charset="0"/>
+              </a:rPr>
+              <a:t>isGuestStatusUploadedByGuestToHomepage</a:t>
+            </a:r>
+            <a:r>
+              <a:rPr lang="en-US" sz="1400" b="1" dirty="0">
+                <a:latin typeface="Arial" panose="020B0604020202020204" pitchFamily="34" charset="0"/>
+                <a:cs typeface="Arial" panose="020B0604020202020204" pitchFamily="34" charset="0"/>
+              </a:rPr>
+              <a:t>(</a:t>
+            </a:r>
+            <a:r>
+              <a:rPr lang="en-US" sz="1400" b="1" dirty="0" err="1">
+                <a:latin typeface="Arial" panose="020B0604020202020204" pitchFamily="34" charset="0"/>
+                <a:cs typeface="Arial" panose="020B0604020202020204" pitchFamily="34" charset="0"/>
+              </a:rPr>
+              <a:t>i_record_number</a:t>
+            </a:r>
+            <a:r>
+              <a:rPr lang="en-US" sz="1400" b="1" dirty="0">
+                <a:latin typeface="Arial" panose="020B0604020202020204" pitchFamily="34" charset="0"/>
+                <a:cs typeface="Arial" panose="020B0604020202020204" pitchFamily="34" charset="0"/>
+              </a:rPr>
+              <a:t>)</a:t>
+            </a:r>
+          </a:p>
+        </p:txBody>
+      </p:sp>
+    </p:spTree>
+    <p:extLst>
+      <p:ext uri="{BB962C8B-B14F-4D97-AF65-F5344CB8AC3E}">
+        <p14:creationId xmlns:p14="http://schemas.microsoft.com/office/powerpoint/2010/main" val="850839589"/>
+      </p:ext>
+    </p:extLst>
+  </p:cSld>
+  <p:clrMapOvr>
+    <a:masterClrMapping/>
+  </p:clrMapOvr>
+</p:sld>
+</file>
+
+<file path=ppt/slides/slide4.xml><?xml version="1.0" encoding="utf-8"?>
 <p:sld xmlns:a="http://schemas.openxmlformats.org/drawingml/2006/main" xmlns:r="http://schemas.openxmlformats.org/officeDocument/2006/relationships" xmlns:p="http://schemas.openxmlformats.org/presentationml/2006/main">
   <p:cSld>
     <p:spTree>

</xml_diff>